<commit_message>
Change wording in presentation
</commit_message>
<xml_diff>
--- a/Project_Presentation.pptx
+++ b/Project_Presentation.pptx
@@ -4763,11 +4763,7 @@
             </a:pPr>
             <a:r>
               <a:rPr lang="en-US" dirty="0" smtClean="0"/>
-              <a:t> </a:t>
-            </a:r>
-            <a:r>
-              <a:rPr lang="en-US" dirty="0" smtClean="0"/>
-              <a:t>Ability to predict and follow a specific player by number</a:t>
+              <a:t> Ability to predict and follow a specific player by number</a:t>
             </a:r>
           </a:p>
           <a:p>
@@ -4780,11 +4776,7 @@
             </a:pPr>
             <a:r>
               <a:rPr lang="en-US" dirty="0" smtClean="0"/>
-              <a:t> </a:t>
-            </a:r>
-            <a:r>
-              <a:rPr lang="en-US" dirty="0" smtClean="0"/>
-              <a:t>Provide a way for teams to review games from a higher angle </a:t>
+              <a:t> Provide a way for teams to review games from a higher angle </a:t>
             </a:r>
             <a:endParaRPr dirty="0"/>
           </a:p>
@@ -4869,11 +4861,7 @@
             </a:pPr>
             <a:r>
               <a:rPr lang="en-US" dirty="0" smtClean="0"/>
-              <a:t> </a:t>
-            </a:r>
-            <a:r>
-              <a:rPr lang="en-US" dirty="0" smtClean="0"/>
-              <a:t>Able to input each team’s player number and information</a:t>
+              <a:t> Able to input each team’s player number and information</a:t>
             </a:r>
           </a:p>
           <a:p>
@@ -4883,11 +4871,7 @@
             </a:pPr>
             <a:r>
               <a:rPr lang="en-US" dirty="0" smtClean="0"/>
-              <a:t> </a:t>
-            </a:r>
-            <a:r>
-              <a:rPr lang="en-US" dirty="0" smtClean="0"/>
-              <a:t>Maybe have a option to show live video feed</a:t>
+              <a:t> Maybe have a option to show live video feed</a:t>
             </a:r>
           </a:p>
         </p:txBody>
@@ -4971,7 +4955,6 @@
               <a:rPr lang="en-US" dirty="0" smtClean="0"/>
               <a:t> (Open Computer Vision)</a:t>
             </a:r>
-            <a:endParaRPr lang="en-US" dirty="0" smtClean="0"/>
           </a:p>
           <a:p>
             <a:pPr>
@@ -4990,19 +4973,7 @@
             </a:pPr>
             <a:r>
               <a:rPr lang="en-US" dirty="0" smtClean="0"/>
-              <a:t> </a:t>
-            </a:r>
-            <a:r>
-              <a:rPr lang="en-US" dirty="0" smtClean="0"/>
-              <a:t>Maybe </a:t>
-            </a:r>
-            <a:r>
-              <a:rPr lang="en-US" dirty="0" smtClean="0"/>
-              <a:t>use raspberry </a:t>
-            </a:r>
-            <a:r>
-              <a:rPr lang="en-US" dirty="0" smtClean="0"/>
-              <a:t>pi for controller</a:t>
+              <a:t> Maybe use raspberry pi for controller</a:t>
             </a:r>
           </a:p>
         </p:txBody>
@@ -5049,15 +5020,7 @@
           <a:p>
             <a:r>
               <a:rPr lang="en-US" dirty="0" smtClean="0"/>
-              <a:t>Preliminary 	</a:t>
-            </a:r>
-            <a:r>
-              <a:rPr lang="en-US" dirty="0" smtClean="0"/>
-              <a:t>D</a:t>
-            </a:r>
-            <a:r>
-              <a:rPr lang="en-US" dirty="0" smtClean="0"/>
-              <a:t>evelopment Schedule</a:t>
+              <a:t>Preliminary 	Development Schedule</a:t>
             </a:r>
             <a:endParaRPr lang="en-US" dirty="0"/>
           </a:p>
@@ -5084,11 +5047,17 @@
             </a:pPr>
             <a:r>
               <a:rPr lang="en-US" dirty="0" smtClean="0"/>
-              <a:t> </a:t>
+              <a:t> Get access to a drone</a:t>
             </a:r>
+          </a:p>
+          <a:p>
+            <a:pPr>
+              <a:buFont typeface="Arial" pitchFamily="34" charset="0"/>
+              <a:buChar char="•"/>
+            </a:pPr>
             <a:r>
               <a:rPr lang="en-US" dirty="0" smtClean="0"/>
-              <a:t>Get access to a drone</a:t>
+              <a:t> Set up live feedback from drone</a:t>
             </a:r>
           </a:p>
           <a:p>
@@ -5102,18 +5071,9 @@
             </a:r>
             <a:r>
               <a:rPr lang="en-US" dirty="0" smtClean="0"/>
-              <a:t>Set up live feedback from drone</a:t>
+              <a:t>Start programming algorithms to follow players</a:t>
             </a:r>
-          </a:p>
-          <a:p>
-            <a:pPr>
-              <a:buFont typeface="Arial" pitchFamily="34" charset="0"/>
-              <a:buChar char="•"/>
-            </a:pPr>
-            <a:r>
-              <a:rPr lang="en-US" dirty="0" smtClean="0"/>
-              <a:t> Possible live image recognition</a:t>
-            </a:r>
+            <a:endParaRPr lang="en-US" dirty="0" smtClean="0"/>
           </a:p>
           <a:p>
             <a:endParaRPr lang="en-US" dirty="0"/>

</xml_diff>

<commit_message>
Add more detailed schedule
</commit_message>
<xml_diff>
--- a/Project_Presentation.pptx
+++ b/Project_Presentation.pptx
@@ -17,17 +17,6 @@
   </p:sldIdLst>
   <p:sldSz cx="9144000" cy="5143500" type="screen16x9"/>
   <p:notesSz cx="6858000" cy="9144000"/>
-  <p:embeddedFontLst>
-    <p:embeddedFont>
-      <p:font typeface="Oswald" charset="0"/>
-      <p:regular r:id="rId9"/>
-      <p:bold r:id="rId10"/>
-    </p:embeddedFont>
-    <p:embeddedFont>
-      <p:font typeface="Average" charset="0"/>
-      <p:regular r:id="rId11"/>
-    </p:embeddedFont>
-  </p:embeddedFontLst>
   <p:defaultTextStyle>
     <a:defPPr marR="0" lvl="0" algn="l" rtl="0">
       <a:lnSpc>
@@ -393,6 +382,11 @@
         </p:txBody>
       </p:sp>
     </p:spTree>
+    <p:extLst>
+      <p:ext uri="{BB962C8B-B14F-4D97-AF65-F5344CB8AC3E}">
+        <p14:creationId xmlns:p14="http://schemas.microsoft.com/office/powerpoint/2010/main" val="3200190068"/>
+      </p:ext>
+    </p:extLst>
   </p:cSld>
   <p:clrMap bg1="lt1" tx1="dk1" bg2="dk2" tx2="lt2" accent1="accent1" accent2="accent2" accent3="accent3" accent4="accent4" accent5="accent5" accent6="accent6" hlink="hlink" folHlink="folHlink"/>
   <p:notesStyle>
@@ -4973,8 +4967,27 @@
             </a:pPr>
             <a:r>
               <a:rPr lang="en-US" dirty="0" smtClean="0"/>
-              <a:t> Maybe use raspberry pi for controller</a:t>
+              <a:t> Maybe use raspberry pi for </a:t>
             </a:r>
+            <a:r>
+              <a:rPr lang="en-US" dirty="0" smtClean="0"/>
+              <a:t>controller</a:t>
+            </a:r>
+          </a:p>
+          <a:p>
+            <a:pPr>
+              <a:buFont typeface="Arial" pitchFamily="34" charset="0"/>
+              <a:buChar char="•"/>
+            </a:pPr>
+            <a:r>
+              <a:rPr lang="en-US" dirty="0"/>
+              <a:t> </a:t>
+            </a:r>
+            <a:r>
+              <a:rPr lang="en-US" dirty="0" smtClean="0"/>
+              <a:t>Sublime</a:t>
+            </a:r>
+            <a:endParaRPr lang="en-US" dirty="0" smtClean="0"/>
           </a:p>
         </p:txBody>
       </p:sp>
@@ -5041,42 +5054,92 @@
           <a:bodyPr/>
           <a:lstStyle/>
           <a:p>
-            <a:pPr>
-              <a:buFont typeface="Arial" pitchFamily="34" charset="0"/>
+            <a:r>
+              <a:rPr lang="en-US" sz="1400" dirty="0" smtClean="0"/>
+              <a:t>Week 1 – 5: Research</a:t>
+            </a:r>
+          </a:p>
+          <a:p>
+            <a:pPr marL="285750" indent="-285750">
+              <a:buFont typeface="Arial"/>
+              <a:buChar char="•"/>
+            </a:pPr>
+            <a:r>
+              <a:rPr lang="en-US" sz="1400" dirty="0" smtClean="0"/>
+              <a:t>Get </a:t>
+            </a:r>
+            <a:r>
+              <a:rPr lang="en-US" sz="1400" dirty="0" smtClean="0"/>
+              <a:t>access to a </a:t>
+            </a:r>
+            <a:r>
+              <a:rPr lang="en-US" sz="1400" dirty="0" smtClean="0"/>
+              <a:t>drone</a:t>
+            </a:r>
+          </a:p>
+          <a:p>
+            <a:r>
+              <a:rPr lang="en-US" sz="1400" dirty="0" smtClean="0"/>
+              <a:t>Week 5 – 10: Development ~ Alpha</a:t>
+            </a:r>
+            <a:endParaRPr lang="en-US" sz="1400" dirty="0" smtClean="0"/>
+          </a:p>
+          <a:p>
+            <a:pPr marL="285750" indent="-285750">
+              <a:buFont typeface="Arial"/>
+              <a:buChar char="•"/>
+            </a:pPr>
+            <a:r>
+              <a:rPr lang="en-US" sz="1400" dirty="0" smtClean="0"/>
+              <a:t> </a:t>
+            </a:r>
+            <a:r>
+              <a:rPr lang="en-US" sz="1400" dirty="0" smtClean="0"/>
+              <a:t>Set up live feedback from </a:t>
+            </a:r>
+            <a:r>
+              <a:rPr lang="en-US" sz="1400" dirty="0" smtClean="0"/>
+              <a:t>drone</a:t>
+            </a:r>
+          </a:p>
+          <a:p>
+            <a:pPr marL="285750" lvl="1" indent="-285750">
+              <a:buFont typeface="Arial"/>
               <a:buChar char="•"/>
             </a:pPr>
             <a:r>
               <a:rPr lang="en-US" dirty="0" smtClean="0"/>
-              <a:t> Get access to a drone</a:t>
+              <a:t>Start </a:t>
             </a:r>
-          </a:p>
-          <a:p>
-            <a:pPr>
-              <a:buFont typeface="Arial" pitchFamily="34" charset="0"/>
+            <a:r>
+              <a:rPr lang="en-US" dirty="0" smtClean="0"/>
+              <a:t>programming algorithms to follow </a:t>
+            </a:r>
+            <a:r>
+              <a:rPr lang="en-US" dirty="0" smtClean="0"/>
+              <a:t>players</a:t>
+            </a:r>
+          </a:p>
+          <a:p>
+            <a:pPr lvl="1"/>
+            <a:r>
+              <a:rPr lang="en-US" dirty="0" smtClean="0"/>
+              <a:t>Week 10 – 15: MVP </a:t>
+            </a:r>
+          </a:p>
+          <a:p>
+            <a:pPr marL="285750" lvl="1" indent="-285750">
+              <a:buFont typeface="Arial"/>
               <a:buChar char="•"/>
             </a:pPr>
             <a:r>
               <a:rPr lang="en-US" dirty="0" smtClean="0"/>
-              <a:t> Set up live feedback from drone</a:t>
-            </a:r>
-          </a:p>
-          <a:p>
-            <a:pPr>
-              <a:buFont typeface="Arial" pitchFamily="34" charset="0"/>
-              <a:buChar char="•"/>
-            </a:pPr>
-            <a:r>
-              <a:rPr lang="en-US" dirty="0" smtClean="0"/>
-              <a:t> </a:t>
-            </a:r>
-            <a:r>
-              <a:rPr lang="en-US" dirty="0" smtClean="0"/>
-              <a:t>Start programming algorithms to follow players</a:t>
+              <a:t>Have working beta </a:t>
             </a:r>
             <a:endParaRPr lang="en-US" dirty="0" smtClean="0"/>
           </a:p>
           <a:p>
-            <a:endParaRPr lang="en-US" dirty="0"/>
+            <a:endParaRPr lang="en-US" sz="1400" dirty="0"/>
           </a:p>
         </p:txBody>
       </p:sp>
@@ -5118,7 +5181,7 @@
         <p:spPr>
           <a:xfrm>
             <a:off x="2286000" y="1657350"/>
-            <a:ext cx="5181600" cy="2667000"/>
+            <a:ext cx="5715000" cy="2667000"/>
           </a:xfrm>
         </p:spPr>
         <p:txBody>

</xml_diff>

<commit_message>
Add Status report 2/20
</commit_message>
<xml_diff>
--- a/Project_Presentation.pptx
+++ b/Project_Presentation.pptx
@@ -4652,6 +4652,13 @@
   <p:clrMapOvr>
     <a:masterClrMapping/>
   </p:clrMapOvr>
+  <p:timing>
+    <p:tnLst>
+      <p:par>
+        <p:cTn xmlns:p14="http://schemas.microsoft.com/office/powerpoint/2010/main" id="1" dur="indefinite" restart="never" nodeType="tmRoot"/>
+      </p:par>
+    </p:tnLst>
+  </p:timing>
 </p:sld>
 </file>
 
@@ -4744,7 +4751,15 @@
             </a:pPr>
             <a:r>
               <a:rPr lang="en-US" dirty="0" smtClean="0"/>
-              <a:t> This projects aims to develop an drone controlled by an AI to record and follow the flow of a basketball game. </a:t>
+              <a:t> This projects aims to develop an drone AI to record and </a:t>
+            </a:r>
+            <a:r>
+              <a:rPr lang="en-US" smtClean="0"/>
+              <a:t>be able to </a:t>
+            </a:r>
+            <a:r>
+              <a:rPr lang="en-US" dirty="0" smtClean="0"/>
+              <a:t>follow the flow of a basketball game. </a:t>
             </a:r>
           </a:p>
           <a:p>
@@ -4781,6 +4796,13 @@
   <p:clrMapOvr>
     <a:masterClrMapping/>
   </p:clrMapOvr>
+  <p:timing>
+    <p:tnLst>
+      <p:par>
+        <p:cTn xmlns:p14="http://schemas.microsoft.com/office/powerpoint/2010/main" id="1" dur="indefinite" restart="never" nodeType="tmRoot"/>
+      </p:par>
+    </p:tnLst>
+  </p:timing>
 </p:sld>
 </file>
 
@@ -4875,6 +4897,13 @@
   <p:clrMapOvr>
     <a:masterClrMapping/>
   </p:clrMapOvr>
+  <p:timing>
+    <p:tnLst>
+      <p:par>
+        <p:cTn xmlns:p14="http://schemas.microsoft.com/office/powerpoint/2010/main" id="1" dur="indefinite" restart="never" nodeType="tmRoot"/>
+      </p:par>
+    </p:tnLst>
+  </p:timing>
 </p:sld>
 </file>
 
@@ -4967,11 +4996,7 @@
             </a:pPr>
             <a:r>
               <a:rPr lang="en-US" dirty="0" smtClean="0"/>
-              <a:t> Maybe use raspberry pi for </a:t>
-            </a:r>
-            <a:r>
-              <a:rPr lang="en-US" dirty="0" smtClean="0"/>
-              <a:t>controller</a:t>
+              <a:t> Maybe use raspberry pi for controller</a:t>
             </a:r>
           </a:p>
           <a:p>
@@ -4987,7 +5012,6 @@
               <a:rPr lang="en-US" dirty="0" smtClean="0"/>
               <a:t>Sublime</a:t>
             </a:r>
-            <a:endParaRPr lang="en-US" dirty="0" smtClean="0"/>
           </a:p>
         </p:txBody>
       </p:sp>
@@ -4996,6 +5020,13 @@
   <p:clrMapOvr>
     <a:masterClrMapping/>
   </p:clrMapOvr>
+  <p:timing>
+    <p:tnLst>
+      <p:par>
+        <p:cTn xmlns:p14="http://schemas.microsoft.com/office/powerpoint/2010/main" id="1" dur="indefinite" restart="never" nodeType="tmRoot"/>
+      </p:par>
+    </p:tnLst>
+  </p:timing>
 </p:sld>
 </file>
 
@@ -5033,7 +5064,7 @@
           <a:p>
             <a:r>
               <a:rPr lang="en-US" dirty="0" smtClean="0"/>
-              <a:t>Preliminary 	Development Schedule</a:t>
+              <a:t>Preliminary Development Schedule</a:t>
             </a:r>
             <a:endParaRPr lang="en-US" dirty="0"/>
           </a:p>
@@ -5066,15 +5097,7 @@
             </a:pPr>
             <a:r>
               <a:rPr lang="en-US" sz="1400" dirty="0" smtClean="0"/>
-              <a:t>Get </a:t>
-            </a:r>
-            <a:r>
-              <a:rPr lang="en-US" sz="1400" dirty="0" smtClean="0"/>
-              <a:t>access to a </a:t>
-            </a:r>
-            <a:r>
-              <a:rPr lang="en-US" sz="1400" dirty="0" smtClean="0"/>
-              <a:t>drone</a:t>
+              <a:t>Get access to a drone</a:t>
             </a:r>
           </a:p>
           <a:p>
@@ -5082,7 +5105,6 @@
               <a:rPr lang="en-US" sz="1400" dirty="0" smtClean="0"/>
               <a:t>Week 5 – 10: Development ~ Alpha</a:t>
             </a:r>
-            <a:endParaRPr lang="en-US" sz="1400" dirty="0" smtClean="0"/>
           </a:p>
           <a:p>
             <a:pPr marL="285750" indent="-285750">
@@ -5091,15 +5113,7 @@
             </a:pPr>
             <a:r>
               <a:rPr lang="en-US" sz="1400" dirty="0" smtClean="0"/>
-              <a:t> </a:t>
-            </a:r>
-            <a:r>
-              <a:rPr lang="en-US" sz="1400" dirty="0" smtClean="0"/>
-              <a:t>Set up live feedback from </a:t>
-            </a:r>
-            <a:r>
-              <a:rPr lang="en-US" sz="1400" dirty="0" smtClean="0"/>
-              <a:t>drone</a:t>
+              <a:t> Set up live feedback from drone</a:t>
             </a:r>
           </a:p>
           <a:p>
@@ -5109,15 +5123,7 @@
             </a:pPr>
             <a:r>
               <a:rPr lang="en-US" dirty="0" smtClean="0"/>
-              <a:t>Start </a:t>
-            </a:r>
-            <a:r>
-              <a:rPr lang="en-US" dirty="0" smtClean="0"/>
-              <a:t>programming algorithms to follow </a:t>
-            </a:r>
-            <a:r>
-              <a:rPr lang="en-US" dirty="0" smtClean="0"/>
-              <a:t>players</a:t>
+              <a:t>Start programming algorithms to follow players</a:t>
             </a:r>
           </a:p>
           <a:p>
@@ -5136,7 +5142,6 @@
               <a:rPr lang="en-US" dirty="0" smtClean="0"/>
               <a:t>Have working beta </a:t>
             </a:r>
-            <a:endParaRPr lang="en-US" dirty="0" smtClean="0"/>
           </a:p>
           <a:p>
             <a:endParaRPr lang="en-US" sz="1400" dirty="0"/>
@@ -5148,6 +5153,13 @@
   <p:clrMapOvr>
     <a:masterClrMapping/>
   </p:clrMapOvr>
+  <p:timing>
+    <p:tnLst>
+      <p:par>
+        <p:cTn xmlns:p14="http://schemas.microsoft.com/office/powerpoint/2010/main" id="1" dur="indefinite" restart="never" nodeType="tmRoot"/>
+      </p:par>
+    </p:tnLst>
+  </p:timing>
 </p:sld>
 </file>
 
@@ -5180,7 +5192,7 @@
         </p:nvSpPr>
         <p:spPr>
           <a:xfrm>
-            <a:off x="2286000" y="1657350"/>
+            <a:off x="1981200" y="1504950"/>
             <a:ext cx="5715000" cy="2667000"/>
           </a:xfrm>
         </p:spPr>
@@ -5201,6 +5213,13 @@
   <p:clrMapOvr>
     <a:masterClrMapping/>
   </p:clrMapOvr>
+  <p:timing>
+    <p:tnLst>
+      <p:par>
+        <p:cTn xmlns:p14="http://schemas.microsoft.com/office/powerpoint/2010/main" id="1" dur="indefinite" restart="never" nodeType="tmRoot"/>
+      </p:par>
+    </p:tnLst>
+  </p:timing>
 </p:sld>
 </file>
 

</xml_diff>